<commit_message>
Added YouTube Video desccription, updated 02 presentation.
</commit_message>
<xml_diff>
--- a/Documentation/YouTube/JavaFX 02 Start-Präsentation.pptx
+++ b/Documentation/YouTube/JavaFX 02 Start-Präsentation.pptx
@@ -7,6 +7,7 @@
   <p:sldIdLst>
     <p:sldId id="256" r:id="rId2"/>
     <p:sldId id="257" r:id="rId3"/>
+    <p:sldId id="258" r:id="rId4"/>
   </p:sldIdLst>
   <p:sldSz cx="12192000" cy="6858000"/>
   <p:notesSz cx="6858000" cy="9144000"/>
@@ -260,7 +261,7 @@
           <a:p>
             <a:fld id="{82EDB8D0-98ED-4B86-9D5F-E61ADC70144D}" type="datetimeFigureOut">
               <a:rPr lang="en-US" smtClean="0"/>
-              <a:t>10/29/2020</a:t>
+              <a:t>11/10/2020</a:t>
             </a:fld>
             <a:endParaRPr lang="en-US" dirty="0"/>
           </a:p>
@@ -675,7 +676,7 @@
           <a:p>
             <a:fld id="{82EDB8D0-98ED-4B86-9D5F-E61ADC70144D}" type="datetimeFigureOut">
               <a:rPr lang="en-US" smtClean="0"/>
-              <a:t>10/29/2020</a:t>
+              <a:t>11/10/2020</a:t>
             </a:fld>
             <a:endParaRPr lang="en-US"/>
           </a:p>
@@ -1167,7 +1168,7 @@
           <a:p>
             <a:fld id="{82EDB8D0-98ED-4B86-9D5F-E61ADC70144D}" type="datetimeFigureOut">
               <a:rPr lang="en-US" smtClean="0"/>
-              <a:t>10/29/2020</a:t>
+              <a:t>11/10/2020</a:t>
             </a:fld>
             <a:endParaRPr lang="en-US"/>
           </a:p>
@@ -1654,7 +1655,7 @@
           <a:p>
             <a:fld id="{82EDB8D0-98ED-4B86-9D5F-E61ADC70144D}" type="datetimeFigureOut">
               <a:rPr lang="en-US" smtClean="0"/>
-              <a:t>10/29/2020</a:t>
+              <a:t>11/10/2020</a:t>
             </a:fld>
             <a:endParaRPr lang="en-US" dirty="0"/>
           </a:p>
@@ -2423,7 +2424,7 @@
           <a:p>
             <a:fld id="{82EDB8D0-98ED-4B86-9D5F-E61ADC70144D}" type="datetimeFigureOut">
               <a:rPr lang="en-US" smtClean="0"/>
-              <a:t>10/29/2020</a:t>
+              <a:t>11/10/2020</a:t>
             </a:fld>
             <a:endParaRPr lang="en-US"/>
           </a:p>
@@ -2905,7 +2906,7 @@
           <a:p>
             <a:fld id="{82EDB8D0-98ED-4B86-9D5F-E61ADC70144D}" type="datetimeFigureOut">
               <a:rPr lang="en-US" smtClean="0"/>
-              <a:t>10/29/2020</a:t>
+              <a:t>11/10/2020</a:t>
             </a:fld>
             <a:endParaRPr lang="en-US"/>
           </a:p>
@@ -3601,7 +3602,7 @@
           <a:p>
             <a:fld id="{82EDB8D0-98ED-4B86-9D5F-E61ADC70144D}" type="datetimeFigureOut">
               <a:rPr lang="en-US" smtClean="0"/>
-              <a:t>10/29/2020</a:t>
+              <a:t>11/10/2020</a:t>
             </a:fld>
             <a:endParaRPr lang="en-US"/>
           </a:p>
@@ -4026,7 +4027,7 @@
           <a:p>
             <a:fld id="{82EDB8D0-98ED-4B86-9D5F-E61ADC70144D}" type="datetimeFigureOut">
               <a:rPr lang="en-US" smtClean="0"/>
-              <a:t>10/29/2020</a:t>
+              <a:t>11/10/2020</a:t>
             </a:fld>
             <a:endParaRPr lang="en-US"/>
           </a:p>
@@ -4423,7 +4424,7 @@
           <a:p>
             <a:fld id="{82EDB8D0-98ED-4B86-9D5F-E61ADC70144D}" type="datetimeFigureOut">
               <a:rPr lang="en-US" smtClean="0"/>
-              <a:t>10/29/2020</a:t>
+              <a:t>11/10/2020</a:t>
             </a:fld>
             <a:endParaRPr lang="en-US"/>
           </a:p>
@@ -5018,7 +5019,7 @@
           <a:p>
             <a:fld id="{82EDB8D0-98ED-4B86-9D5F-E61ADC70144D}" type="datetimeFigureOut">
               <a:rPr lang="en-US" smtClean="0"/>
-              <a:t>10/29/2020</a:t>
+              <a:t>11/10/2020</a:t>
             </a:fld>
             <a:endParaRPr lang="en-US"/>
           </a:p>
@@ -5593,7 +5594,7 @@
           <a:p>
             <a:fld id="{82EDB8D0-98ED-4B86-9D5F-E61ADC70144D}" type="datetimeFigureOut">
               <a:rPr lang="en-US" smtClean="0"/>
-              <a:t>10/29/2020</a:t>
+              <a:t>11/10/2020</a:t>
             </a:fld>
             <a:endParaRPr lang="en-US"/>
           </a:p>
@@ -6120,7 +6121,7 @@
             <a:fld id="{82EDB8D0-98ED-4B86-9D5F-E61ADC70144D}" type="datetimeFigureOut">
               <a:rPr lang="en-US" smtClean="0"/>
               <a:pPr/>
-              <a:t>10/29/2020</a:t>
+              <a:t>11/10/2020</a:t>
             </a:fld>
             <a:endParaRPr lang="en-US" dirty="0"/>
           </a:p>
@@ -7644,6 +7645,865 @@
 </p:sld>
 </file>
 
+<file path=ppt/slides/slide3.xml><?xml version="1.0" encoding="utf-8"?>
+<p:sld xmlns:a="http://schemas.openxmlformats.org/drawingml/2006/main" xmlns:r="http://schemas.openxmlformats.org/officeDocument/2006/relationships" xmlns:p="http://schemas.openxmlformats.org/presentationml/2006/main">
+  <p:cSld>
+    <p:bg>
+      <p:bgPr>
+        <a:gradFill flip="none" rotWithShape="1">
+          <a:gsLst>
+            <a:gs pos="0">
+              <a:schemeClr val="accent2">
+                <a:lumMod val="89000"/>
+              </a:schemeClr>
+            </a:gs>
+            <a:gs pos="23000">
+              <a:schemeClr val="accent2">
+                <a:lumMod val="89000"/>
+              </a:schemeClr>
+            </a:gs>
+            <a:gs pos="69000">
+              <a:schemeClr val="accent2">
+                <a:lumMod val="75000"/>
+              </a:schemeClr>
+            </a:gs>
+            <a:gs pos="97000">
+              <a:schemeClr val="accent2">
+                <a:lumMod val="70000"/>
+              </a:schemeClr>
+            </a:gs>
+          </a:gsLst>
+          <a:path path="circle">
+            <a:fillToRect l="50000" t="50000" r="50000" b="50000"/>
+          </a:path>
+          <a:tileRect/>
+        </a:gradFill>
+        <a:effectLst/>
+      </p:bgPr>
+    </p:bg>
+    <p:spTree>
+      <p:nvGrpSpPr>
+        <p:cNvPr id="1" name=""/>
+        <p:cNvGrpSpPr/>
+        <p:nvPr/>
+      </p:nvGrpSpPr>
+      <p:grpSpPr>
+        <a:xfrm>
+          <a:off x="0" y="0"/>
+          <a:ext cx="0" cy="0"/>
+          <a:chOff x="0" y="0"/>
+          <a:chExt cx="0" cy="0"/>
+        </a:xfrm>
+      </p:grpSpPr>
+      <p:sp useBgFill="1">
+        <p:nvSpPr>
+          <p:cNvPr id="17" name="Rectangle 16">
+            <a:extLst>
+              <a:ext uri="{FF2B5EF4-FFF2-40B4-BE49-F238E27FC236}">
+                <a16:creationId xmlns:a16="http://schemas.microsoft.com/office/drawing/2014/main" id="{DCE1AED4-C7FF-4468-BF54-4470A0A3E283}"/>
+              </a:ext>
+              <a:ext uri="{C183D7F6-B498-43B3-948B-1728B52AA6E4}">
+                <adec:decorative xmlns:adec="http://schemas.microsoft.com/office/drawing/2017/decorative" val="1"/>
+              </a:ext>
+            </a:extLst>
+          </p:cNvPr>
+          <p:cNvSpPr>
+            <a:spLocks noGrp="1" noRot="1" noChangeAspect="1" noMove="1" noResize="1" noEditPoints="1" noAdjustHandles="1" noChangeArrowheads="1" noChangeShapeType="1" noTextEdit="1"/>
+          </p:cNvSpPr>
+          <p:nvPr>
+            <p:extLst>
+              <p:ext uri="{386F3935-93C4-4BCD-93E2-E3B085C9AB24}">
+                <p16:designElem xmlns:p16="http://schemas.microsoft.com/office/powerpoint/2015/main" val="1"/>
+              </p:ext>
+            </p:extLst>
+          </p:nvPr>
+        </p:nvSpPr>
+        <p:spPr>
+          <a:xfrm>
+            <a:off x="0" y="0"/>
+            <a:ext cx="12188952" cy="6858000"/>
+          </a:xfrm>
+          <a:prstGeom prst="rect">
+            <a:avLst/>
+          </a:prstGeom>
+          <a:ln>
+            <a:noFill/>
+          </a:ln>
+        </p:spPr>
+        <p:style>
+          <a:lnRef idx="2">
+            <a:schemeClr val="accent1">
+              <a:shade val="50000"/>
+            </a:schemeClr>
+          </a:lnRef>
+          <a:fillRef idx="1">
+            <a:schemeClr val="accent1"/>
+          </a:fillRef>
+          <a:effectRef idx="0">
+            <a:schemeClr val="accent1"/>
+          </a:effectRef>
+          <a:fontRef idx="minor">
+            <a:schemeClr val="lt1"/>
+          </a:fontRef>
+        </p:style>
+        <p:txBody>
+          <a:bodyPr rtlCol="0" anchor="ctr"/>
+          <a:lstStyle/>
+          <a:p>
+            <a:pPr marL="0" marR="0" lvl="0" indent="0" algn="ctr" defTabSz="914400" rtl="0" eaLnBrk="1" fontAlgn="auto" latinLnBrk="0" hangingPunct="1">
+              <a:lnSpc>
+                <a:spcPct val="100000"/>
+              </a:lnSpc>
+              <a:spcBef>
+                <a:spcPts val="0"/>
+              </a:spcBef>
+              <a:spcAft>
+                <a:spcPts val="0"/>
+              </a:spcAft>
+              <a:buClrTx/>
+              <a:buSzTx/>
+              <a:buFontTx/>
+              <a:buNone/>
+              <a:tabLst/>
+              <a:defRPr/>
+            </a:pPr>
+            <a:endParaRPr kumimoji="0" lang="en-US" sz="1800" b="0" i="0" u="none" strike="noStrike" kern="1200" cap="none" spc="0" normalizeH="0" baseline="0" noProof="0">
+              <a:ln>
+                <a:noFill/>
+              </a:ln>
+              <a:solidFill>
+                <a:srgbClr val="FFFFFF"/>
+              </a:solidFill>
+              <a:effectLst/>
+              <a:uLnTx/>
+              <a:uFillTx/>
+              <a:latin typeface="Avenir Next LT Pro"/>
+              <a:ea typeface="+mn-ea"/>
+              <a:cs typeface="+mn-cs"/>
+            </a:endParaRPr>
+          </a:p>
+        </p:txBody>
+      </p:sp>
+      <p:sp>
+        <p:nvSpPr>
+          <p:cNvPr id="19" name="Rectangle 18">
+            <a:extLst>
+              <a:ext uri="{FF2B5EF4-FFF2-40B4-BE49-F238E27FC236}">
+                <a16:creationId xmlns:a16="http://schemas.microsoft.com/office/drawing/2014/main" id="{BDE94FAB-AA60-43B4-A2C3-3A940B9A951A}"/>
+              </a:ext>
+              <a:ext uri="{C183D7F6-B498-43B3-948B-1728B52AA6E4}">
+                <adec:decorative xmlns:adec="http://schemas.microsoft.com/office/drawing/2017/decorative" val="1"/>
+              </a:ext>
+            </a:extLst>
+          </p:cNvPr>
+          <p:cNvSpPr>
+            <a:spLocks noGrp="1" noRot="1" noChangeAspect="1" noMove="1" noResize="1" noEditPoints="1" noAdjustHandles="1" noChangeArrowheads="1" noChangeShapeType="1" noTextEdit="1"/>
+          </p:cNvSpPr>
+          <p:nvPr>
+            <p:extLst>
+              <p:ext uri="{386F3935-93C4-4BCD-93E2-E3B085C9AB24}">
+                <p16:designElem xmlns:p16="http://schemas.microsoft.com/office/powerpoint/2015/main" val="1"/>
+              </p:ext>
+            </p:extLst>
+          </p:nvPr>
+        </p:nvSpPr>
+        <p:spPr>
+          <a:xfrm rot="10800000">
+            <a:off x="-3" y="4530071"/>
+            <a:ext cx="12191999" cy="2327926"/>
+          </a:xfrm>
+          <a:prstGeom prst="rect">
+            <a:avLst/>
+          </a:prstGeom>
+          <a:gradFill flip="none" rotWithShape="1">
+            <a:gsLst>
+              <a:gs pos="44000">
+                <a:schemeClr val="tx1">
+                  <a:alpha val="40000"/>
+                </a:schemeClr>
+              </a:gs>
+              <a:gs pos="100000">
+                <a:schemeClr val="tx1">
+                  <a:alpha val="70000"/>
+                </a:schemeClr>
+              </a:gs>
+              <a:gs pos="0">
+                <a:schemeClr val="tx1">
+                  <a:alpha val="0"/>
+                </a:schemeClr>
+              </a:gs>
+            </a:gsLst>
+            <a:lin ang="16200000" scaled="1"/>
+            <a:tileRect/>
+          </a:gradFill>
+          <a:ln>
+            <a:noFill/>
+          </a:ln>
+        </p:spPr>
+        <p:style>
+          <a:lnRef idx="2">
+            <a:schemeClr val="accent1">
+              <a:shade val="50000"/>
+            </a:schemeClr>
+          </a:lnRef>
+          <a:fillRef idx="1">
+            <a:schemeClr val="accent1"/>
+          </a:fillRef>
+          <a:effectRef idx="0">
+            <a:schemeClr val="accent1"/>
+          </a:effectRef>
+          <a:fontRef idx="minor">
+            <a:schemeClr val="lt1"/>
+          </a:fontRef>
+        </p:style>
+        <p:txBody>
+          <a:bodyPr rtlCol="0" anchor="ctr"/>
+          <a:lstStyle/>
+          <a:p>
+            <a:pPr marL="0" marR="0" lvl="0" indent="0" algn="ctr" defTabSz="914400" rtl="0" eaLnBrk="1" fontAlgn="auto" latinLnBrk="0" hangingPunct="1">
+              <a:lnSpc>
+                <a:spcPct val="100000"/>
+              </a:lnSpc>
+              <a:spcBef>
+                <a:spcPts val="0"/>
+              </a:spcBef>
+              <a:spcAft>
+                <a:spcPts val="0"/>
+              </a:spcAft>
+              <a:buClrTx/>
+              <a:buSzTx/>
+              <a:buFontTx/>
+              <a:buNone/>
+              <a:tabLst/>
+              <a:defRPr/>
+            </a:pPr>
+            <a:endParaRPr kumimoji="0" lang="en-US" sz="1800" b="0" i="0" u="none" strike="noStrike" kern="1200" cap="none" spc="0" normalizeH="0" baseline="0" noProof="0">
+              <a:ln>
+                <a:noFill/>
+              </a:ln>
+              <a:solidFill>
+                <a:srgbClr val="FFFFFF"/>
+              </a:solidFill>
+              <a:effectLst/>
+              <a:uLnTx/>
+              <a:uFillTx/>
+              <a:latin typeface="Avenir Next LT Pro"/>
+              <a:ea typeface="+mn-ea"/>
+              <a:cs typeface="+mn-cs"/>
+            </a:endParaRPr>
+          </a:p>
+        </p:txBody>
+      </p:sp>
+      <p:sp>
+        <p:nvSpPr>
+          <p:cNvPr id="2" name="Titel 1">
+            <a:extLst>
+              <a:ext uri="{FF2B5EF4-FFF2-40B4-BE49-F238E27FC236}">
+                <a16:creationId xmlns:a16="http://schemas.microsoft.com/office/drawing/2014/main" id="{2A5976DA-7C17-4F52-BE57-FA230C80870F}"/>
+              </a:ext>
+            </a:extLst>
+          </p:cNvPr>
+          <p:cNvSpPr>
+            <a:spLocks noGrp="1"/>
+          </p:cNvSpPr>
+          <p:nvPr>
+            <p:ph type="ctrTitle"/>
+          </p:nvPr>
+        </p:nvSpPr>
+        <p:spPr>
+          <a:xfrm>
+            <a:off x="-3044" y="-89849"/>
+            <a:ext cx="5776751" cy="918362"/>
+          </a:xfrm>
+        </p:spPr>
+        <p:txBody>
+          <a:bodyPr>
+            <a:normAutofit/>
+          </a:bodyPr>
+          <a:lstStyle/>
+          <a:p>
+            <a:r>
+              <a:rPr lang="de-DE" sz="4800" dirty="0">
+                <a:solidFill>
+                  <a:schemeClr val="bg1"/>
+                </a:solidFill>
+                <a:latin typeface="Colonna MT" panose="04020805060202030203" pitchFamily="82" charset="0"/>
+              </a:rPr>
+              <a:t>Konrad Neitzels Blog</a:t>
+            </a:r>
+          </a:p>
+        </p:txBody>
+      </p:sp>
+      <p:sp>
+        <p:nvSpPr>
+          <p:cNvPr id="3" name="Untertitel 2">
+            <a:extLst>
+              <a:ext uri="{FF2B5EF4-FFF2-40B4-BE49-F238E27FC236}">
+                <a16:creationId xmlns:a16="http://schemas.microsoft.com/office/drawing/2014/main" id="{578F7570-DC92-44C1-AEAB-F2501AFF049E}"/>
+              </a:ext>
+            </a:extLst>
+          </p:cNvPr>
+          <p:cNvSpPr>
+            <a:spLocks noGrp="1"/>
+          </p:cNvSpPr>
+          <p:nvPr>
+            <p:ph type="subTitle" idx="1"/>
+          </p:nvPr>
+        </p:nvSpPr>
+        <p:spPr>
+          <a:xfrm>
+            <a:off x="56147" y="1314451"/>
+            <a:ext cx="12011849" cy="3027112"/>
+          </a:xfrm>
+        </p:spPr>
+        <p:txBody>
+          <a:bodyPr>
+            <a:normAutofit/>
+          </a:bodyPr>
+          <a:lstStyle/>
+          <a:p>
+            <a:r>
+              <a:rPr lang="de-DE" sz="3100" b="1" u="sng" dirty="0">
+                <a:solidFill>
+                  <a:schemeClr val="accent1">
+                    <a:lumMod val="20000"/>
+                    <a:lumOff val="80000"/>
+                  </a:schemeClr>
+                </a:solidFill>
+              </a:rPr>
+              <a:t>Fragen? Anregungen? Kritik?</a:t>
+            </a:r>
+          </a:p>
+          <a:p>
+            <a:pPr marL="342900" indent="-342900" algn="l">
+              <a:buFont typeface="Arial" panose="020B0604020202020204" pitchFamily="34" charset="0"/>
+              <a:buChar char="•"/>
+            </a:pPr>
+            <a:endParaRPr lang="de-DE" dirty="0">
+              <a:solidFill>
+                <a:schemeClr val="bg1"/>
+              </a:solidFill>
+            </a:endParaRPr>
+          </a:p>
+          <a:p>
+            <a:pPr algn="l"/>
+            <a:r>
+              <a:rPr lang="de-DE" dirty="0">
+                <a:solidFill>
+                  <a:schemeClr val="bg1"/>
+                </a:solidFill>
+              </a:rPr>
+              <a:t>-&gt; Als Kommentar auf YouTube unter das Video</a:t>
+            </a:r>
+          </a:p>
+          <a:p>
+            <a:pPr algn="l"/>
+            <a:r>
+              <a:rPr lang="de-DE" dirty="0">
+                <a:solidFill>
+                  <a:schemeClr val="bg1"/>
+                </a:solidFill>
+              </a:rPr>
+              <a:t>-&gt; Per Email an </a:t>
+            </a:r>
+            <a:r>
+              <a:rPr lang="de-DE" dirty="0">
+                <a:solidFill>
+                  <a:schemeClr val="bg1"/>
+                </a:solidFill>
+                <a:hlinkClick r:id="rId2"/>
+              </a:rPr>
+              <a:t>konrad@kneitzel.de</a:t>
+            </a:r>
+            <a:endParaRPr lang="de-DE" dirty="0">
+              <a:solidFill>
+                <a:schemeClr val="bg1"/>
+              </a:solidFill>
+            </a:endParaRPr>
+          </a:p>
+          <a:p>
+            <a:pPr algn="l"/>
+            <a:endParaRPr lang="de-DE" dirty="0">
+              <a:solidFill>
+                <a:schemeClr val="bg1"/>
+              </a:solidFill>
+            </a:endParaRPr>
+          </a:p>
+          <a:p>
+            <a:pPr algn="l"/>
+            <a:r>
+              <a:rPr lang="de-DE" dirty="0">
+                <a:solidFill>
+                  <a:schemeClr val="bg1"/>
+                </a:solidFill>
+              </a:rPr>
+              <a:t>Allgemeine Fragen gerne ins Java Forum</a:t>
+            </a:r>
+            <a:r>
+              <a:rPr lang="de-DE">
+                <a:solidFill>
+                  <a:schemeClr val="bg1"/>
+                </a:solidFill>
+              </a:rPr>
+              <a:t>: https://java-forum.org</a:t>
+            </a:r>
+            <a:endParaRPr lang="de-DE" dirty="0">
+              <a:solidFill>
+                <a:schemeClr val="bg1"/>
+              </a:solidFill>
+            </a:endParaRPr>
+          </a:p>
+          <a:p>
+            <a:pPr algn="l"/>
+            <a:endParaRPr lang="de-DE" dirty="0">
+              <a:solidFill>
+                <a:schemeClr val="bg1"/>
+              </a:solidFill>
+            </a:endParaRPr>
+          </a:p>
+        </p:txBody>
+      </p:sp>
+      <p:sp>
+        <p:nvSpPr>
+          <p:cNvPr id="5" name="Textfeld 4">
+            <a:extLst>
+              <a:ext uri="{FF2B5EF4-FFF2-40B4-BE49-F238E27FC236}">
+                <a16:creationId xmlns:a16="http://schemas.microsoft.com/office/drawing/2014/main" id="{535C731E-A2FA-49E9-A931-DFA2856F88A0}"/>
+              </a:ext>
+            </a:extLst>
+          </p:cNvPr>
+          <p:cNvSpPr txBox="1"/>
+          <p:nvPr/>
+        </p:nvSpPr>
+        <p:spPr>
+          <a:xfrm>
+            <a:off x="-3044" y="647690"/>
+            <a:ext cx="5776751" cy="369332"/>
+          </a:xfrm>
+          <a:prstGeom prst="rect">
+            <a:avLst/>
+          </a:prstGeom>
+          <a:noFill/>
+        </p:spPr>
+        <p:txBody>
+          <a:bodyPr wrap="square" rtlCol="0">
+            <a:spAutoFit/>
+          </a:bodyPr>
+          <a:lstStyle/>
+          <a:p>
+            <a:pPr marL="0" marR="0" lvl="0" indent="0" algn="ctr" defTabSz="914400" rtl="0" eaLnBrk="1" fontAlgn="auto" latinLnBrk="0" hangingPunct="1">
+              <a:lnSpc>
+                <a:spcPct val="100000"/>
+              </a:lnSpc>
+              <a:spcBef>
+                <a:spcPts val="0"/>
+              </a:spcBef>
+              <a:spcAft>
+                <a:spcPts val="0"/>
+              </a:spcAft>
+              <a:buClrTx/>
+              <a:buSzTx/>
+              <a:buFontTx/>
+              <a:buNone/>
+              <a:tabLst/>
+              <a:defRPr/>
+            </a:pPr>
+            <a:r>
+              <a:rPr kumimoji="0" lang="de-DE" sz="1800" b="0" i="0" u="none" strike="noStrike" kern="1200" cap="none" spc="0" normalizeH="0" baseline="0" noProof="0" dirty="0">
+                <a:ln>
+                  <a:noFill/>
+                </a:ln>
+                <a:solidFill>
+                  <a:srgbClr val="FFFFFF"/>
+                </a:solidFill>
+                <a:effectLst/>
+                <a:uLnTx/>
+                <a:uFillTx/>
+                <a:latin typeface="Avenir Next LT Pro"/>
+                <a:ea typeface="+mn-ea"/>
+                <a:cs typeface="+mn-cs"/>
+              </a:rPr>
+              <a:t>https://blog.kneitzel.de</a:t>
+            </a:r>
+          </a:p>
+        </p:txBody>
+      </p:sp>
+      <p:sp>
+        <p:nvSpPr>
+          <p:cNvPr id="4" name="Textfeld 3">
+            <a:extLst>
+              <a:ext uri="{FF2B5EF4-FFF2-40B4-BE49-F238E27FC236}">
+                <a16:creationId xmlns:a16="http://schemas.microsoft.com/office/drawing/2014/main" id="{C4B459C2-59E2-4119-B56D-D7C4034918BB}"/>
+              </a:ext>
+            </a:extLst>
+          </p:cNvPr>
+          <p:cNvSpPr txBox="1"/>
+          <p:nvPr/>
+        </p:nvSpPr>
+        <p:spPr>
+          <a:xfrm>
+            <a:off x="9814430" y="196240"/>
+            <a:ext cx="2253566" cy="646331"/>
+          </a:xfrm>
+          <a:prstGeom prst="rect">
+            <a:avLst/>
+          </a:prstGeom>
+          <a:noFill/>
+        </p:spPr>
+        <p:txBody>
+          <a:bodyPr wrap="none" rtlCol="0">
+            <a:spAutoFit/>
+          </a:bodyPr>
+          <a:lstStyle/>
+          <a:p>
+            <a:pPr marL="0" marR="0" lvl="0" indent="0" algn="l" defTabSz="914400" rtl="0" eaLnBrk="1" fontAlgn="auto" latinLnBrk="0" hangingPunct="1">
+              <a:lnSpc>
+                <a:spcPct val="100000"/>
+              </a:lnSpc>
+              <a:spcBef>
+                <a:spcPts val="0"/>
+              </a:spcBef>
+              <a:spcAft>
+                <a:spcPts val="0"/>
+              </a:spcAft>
+              <a:buClrTx/>
+              <a:buSzTx/>
+              <a:buFontTx/>
+              <a:buNone/>
+              <a:tabLst/>
+              <a:defRPr/>
+            </a:pPr>
+            <a:r>
+              <a:rPr kumimoji="0" lang="de-DE" sz="1800" b="0" i="0" u="none" strike="noStrike" kern="1200" cap="none" spc="0" normalizeH="0" baseline="0" noProof="0" dirty="0">
+                <a:ln>
+                  <a:noFill/>
+                </a:ln>
+                <a:solidFill>
+                  <a:srgbClr val="FFFFFF"/>
+                </a:solidFill>
+                <a:effectLst/>
+                <a:uLnTx/>
+                <a:uFillTx/>
+                <a:latin typeface="Avenir Next LT Pro"/>
+                <a:ea typeface="+mn-ea"/>
+                <a:cs typeface="+mn-cs"/>
+              </a:rPr>
+              <a:t>Konrad Neitzel</a:t>
+            </a:r>
+            <a:br>
+              <a:rPr kumimoji="0" lang="de-DE" sz="1800" b="0" i="0" u="none" strike="noStrike" kern="1200" cap="none" spc="0" normalizeH="0" baseline="0" noProof="0" dirty="0">
+                <a:ln>
+                  <a:noFill/>
+                </a:ln>
+                <a:solidFill>
+                  <a:srgbClr val="FFFFFF"/>
+                </a:solidFill>
+                <a:effectLst/>
+                <a:uLnTx/>
+                <a:uFillTx/>
+                <a:latin typeface="Avenir Next LT Pro"/>
+                <a:ea typeface="+mn-ea"/>
+                <a:cs typeface="+mn-cs"/>
+              </a:rPr>
+            </a:br>
+            <a:r>
+              <a:rPr kumimoji="0" lang="de-DE" sz="1800" b="0" i="0" u="none" strike="noStrike" kern="1200" cap="none" spc="0" normalizeH="0" baseline="0" noProof="0" dirty="0">
+                <a:ln>
+                  <a:noFill/>
+                </a:ln>
+                <a:solidFill>
+                  <a:srgbClr val="FFFFFF"/>
+                </a:solidFill>
+                <a:effectLst/>
+                <a:uLnTx/>
+                <a:uFillTx/>
+                <a:latin typeface="Avenir Next LT Pro"/>
+                <a:ea typeface="+mn-ea"/>
+                <a:cs typeface="+mn-cs"/>
+              </a:rPr>
+              <a:t>konrad@kneitzel.de</a:t>
+            </a:r>
+          </a:p>
+        </p:txBody>
+      </p:sp>
+      <p:pic>
+        <p:nvPicPr>
+          <p:cNvPr id="6" name="Grafik 5">
+            <a:extLst>
+              <a:ext uri="{FF2B5EF4-FFF2-40B4-BE49-F238E27FC236}">
+                <a16:creationId xmlns:a16="http://schemas.microsoft.com/office/drawing/2014/main" id="{BA4AE64F-E09D-479D-AAC4-BFEC60292E3A}"/>
+              </a:ext>
+            </a:extLst>
+          </p:cNvPr>
+          <p:cNvPicPr>
+            <a:picLocks noChangeAspect="1"/>
+          </p:cNvPicPr>
+          <p:nvPr/>
+        </p:nvPicPr>
+        <p:blipFill>
+          <a:blip r:embed="rId3">
+            <a:extLst>
+              <a:ext uri="{28A0092B-C50C-407E-A947-70E740481C1C}">
+                <a14:useLocalDpi xmlns:a14="http://schemas.microsoft.com/office/drawing/2010/main" val="0"/>
+              </a:ext>
+            </a:extLst>
+          </a:blip>
+          <a:stretch>
+            <a:fillRect/>
+          </a:stretch>
+        </p:blipFill>
+        <p:spPr>
+          <a:xfrm>
+            <a:off x="9323086" y="233332"/>
+            <a:ext cx="488300" cy="595181"/>
+          </a:xfrm>
+          <a:prstGeom prst="rect">
+            <a:avLst/>
+          </a:prstGeom>
+        </p:spPr>
+      </p:pic>
+      <p:sp>
+        <p:nvSpPr>
+          <p:cNvPr id="9" name="Untertitel 2">
+            <a:extLst>
+              <a:ext uri="{FF2B5EF4-FFF2-40B4-BE49-F238E27FC236}">
+                <a16:creationId xmlns:a16="http://schemas.microsoft.com/office/drawing/2014/main" id="{36A71E7E-9D01-4B7B-A4B1-84771E458359}"/>
+              </a:ext>
+            </a:extLst>
+          </p:cNvPr>
+          <p:cNvSpPr txBox="1">
+            <a:spLocks/>
+          </p:cNvSpPr>
+          <p:nvPr/>
+        </p:nvSpPr>
+        <p:spPr>
+          <a:xfrm>
+            <a:off x="0" y="5489156"/>
+            <a:ext cx="12011849" cy="912562"/>
+          </a:xfrm>
+          <a:prstGeom prst="rect">
+            <a:avLst/>
+          </a:prstGeom>
+        </p:spPr>
+        <p:txBody>
+          <a:bodyPr vert="horz" lIns="91440" tIns="45720" rIns="91440" bIns="45720" rtlCol="0">
+            <a:normAutofit/>
+          </a:bodyPr>
+          <a:lstStyle>
+            <a:lvl1pPr marL="0" indent="0" algn="ctr" defTabSz="914400" rtl="0" eaLnBrk="1" latinLnBrk="0" hangingPunct="1">
+              <a:lnSpc>
+                <a:spcPct val="90000"/>
+              </a:lnSpc>
+              <a:spcBef>
+                <a:spcPts val="1000"/>
+              </a:spcBef>
+              <a:buFont typeface="Arial" panose="020B0604020202020204" pitchFamily="34" charset="0"/>
+              <a:buNone/>
+              <a:defRPr sz="2400" kern="1200">
+                <a:solidFill>
+                  <a:schemeClr val="tx1"/>
+                </a:solidFill>
+                <a:latin typeface="+mn-lt"/>
+                <a:ea typeface="+mn-ea"/>
+                <a:cs typeface="+mn-cs"/>
+              </a:defRPr>
+            </a:lvl1pPr>
+            <a:lvl2pPr marL="457200" indent="0" algn="ctr" defTabSz="914400" rtl="0" eaLnBrk="1" latinLnBrk="0" hangingPunct="1">
+              <a:lnSpc>
+                <a:spcPct val="90000"/>
+              </a:lnSpc>
+              <a:spcBef>
+                <a:spcPts val="500"/>
+              </a:spcBef>
+              <a:buFont typeface="Arial" panose="020B0604020202020204" pitchFamily="34" charset="0"/>
+              <a:buNone/>
+              <a:defRPr sz="2000" kern="1200">
+                <a:solidFill>
+                  <a:schemeClr val="tx1"/>
+                </a:solidFill>
+                <a:latin typeface="+mn-lt"/>
+                <a:ea typeface="+mn-ea"/>
+                <a:cs typeface="+mn-cs"/>
+              </a:defRPr>
+            </a:lvl2pPr>
+            <a:lvl3pPr marL="914400" indent="0" algn="ctr" defTabSz="914400" rtl="0" eaLnBrk="1" latinLnBrk="0" hangingPunct="1">
+              <a:lnSpc>
+                <a:spcPct val="90000"/>
+              </a:lnSpc>
+              <a:spcBef>
+                <a:spcPts val="500"/>
+              </a:spcBef>
+              <a:buFont typeface="Arial" panose="020B0604020202020204" pitchFamily="34" charset="0"/>
+              <a:buNone/>
+              <a:defRPr sz="1800" kern="1200">
+                <a:solidFill>
+                  <a:schemeClr val="tx1"/>
+                </a:solidFill>
+                <a:latin typeface="+mn-lt"/>
+                <a:ea typeface="+mn-ea"/>
+                <a:cs typeface="+mn-cs"/>
+              </a:defRPr>
+            </a:lvl3pPr>
+            <a:lvl4pPr marL="1371600" indent="0" algn="ctr" defTabSz="914400" rtl="0" eaLnBrk="1" latinLnBrk="0" hangingPunct="1">
+              <a:lnSpc>
+                <a:spcPct val="90000"/>
+              </a:lnSpc>
+              <a:spcBef>
+                <a:spcPts val="500"/>
+              </a:spcBef>
+              <a:buFont typeface="Arial" panose="020B0604020202020204" pitchFamily="34" charset="0"/>
+              <a:buNone/>
+              <a:defRPr sz="1600" kern="1200">
+                <a:solidFill>
+                  <a:schemeClr val="tx1"/>
+                </a:solidFill>
+                <a:latin typeface="+mn-lt"/>
+                <a:ea typeface="+mn-ea"/>
+                <a:cs typeface="+mn-cs"/>
+              </a:defRPr>
+            </a:lvl4pPr>
+            <a:lvl5pPr marL="1828800" indent="0" algn="ctr" defTabSz="914400" rtl="0" eaLnBrk="1" latinLnBrk="0" hangingPunct="1">
+              <a:lnSpc>
+                <a:spcPct val="90000"/>
+              </a:lnSpc>
+              <a:spcBef>
+                <a:spcPts val="500"/>
+              </a:spcBef>
+              <a:buFont typeface="Arial" panose="020B0604020202020204" pitchFamily="34" charset="0"/>
+              <a:buNone/>
+              <a:defRPr sz="1600" kern="1200">
+                <a:solidFill>
+                  <a:schemeClr val="tx1"/>
+                </a:solidFill>
+                <a:latin typeface="+mn-lt"/>
+                <a:ea typeface="+mn-ea"/>
+                <a:cs typeface="+mn-cs"/>
+              </a:defRPr>
+            </a:lvl5pPr>
+            <a:lvl6pPr marL="2286000" indent="0" algn="ctr" defTabSz="914400" rtl="0" eaLnBrk="1" latinLnBrk="0" hangingPunct="1">
+              <a:lnSpc>
+                <a:spcPct val="90000"/>
+              </a:lnSpc>
+              <a:spcBef>
+                <a:spcPts val="500"/>
+              </a:spcBef>
+              <a:buFont typeface="Arial" panose="020B0604020202020204" pitchFamily="34" charset="0"/>
+              <a:buNone/>
+              <a:defRPr sz="1600" kern="1200">
+                <a:solidFill>
+                  <a:schemeClr val="tx1"/>
+                </a:solidFill>
+                <a:latin typeface="+mn-lt"/>
+                <a:ea typeface="+mn-ea"/>
+                <a:cs typeface="+mn-cs"/>
+              </a:defRPr>
+            </a:lvl6pPr>
+            <a:lvl7pPr marL="2743200" indent="0" algn="ctr" defTabSz="914400" rtl="0" eaLnBrk="1" latinLnBrk="0" hangingPunct="1">
+              <a:lnSpc>
+                <a:spcPct val="90000"/>
+              </a:lnSpc>
+              <a:spcBef>
+                <a:spcPts val="500"/>
+              </a:spcBef>
+              <a:buFont typeface="Arial" panose="020B0604020202020204" pitchFamily="34" charset="0"/>
+              <a:buNone/>
+              <a:defRPr sz="1600" kern="1200">
+                <a:solidFill>
+                  <a:schemeClr val="tx1"/>
+                </a:solidFill>
+                <a:latin typeface="+mn-lt"/>
+                <a:ea typeface="+mn-ea"/>
+                <a:cs typeface="+mn-cs"/>
+              </a:defRPr>
+            </a:lvl7pPr>
+            <a:lvl8pPr marL="3200400" indent="0" algn="ctr" defTabSz="914400" rtl="0" eaLnBrk="1" latinLnBrk="0" hangingPunct="1">
+              <a:lnSpc>
+                <a:spcPct val="90000"/>
+              </a:lnSpc>
+              <a:spcBef>
+                <a:spcPts val="500"/>
+              </a:spcBef>
+              <a:buFont typeface="Arial" panose="020B0604020202020204" pitchFamily="34" charset="0"/>
+              <a:buNone/>
+              <a:defRPr sz="1600" kern="1200">
+                <a:solidFill>
+                  <a:schemeClr val="tx1"/>
+                </a:solidFill>
+                <a:latin typeface="+mn-lt"/>
+                <a:ea typeface="+mn-ea"/>
+                <a:cs typeface="+mn-cs"/>
+              </a:defRPr>
+            </a:lvl8pPr>
+            <a:lvl9pPr marL="3657600" indent="0" algn="ctr" defTabSz="914400" rtl="0" eaLnBrk="1" latinLnBrk="0" hangingPunct="1">
+              <a:lnSpc>
+                <a:spcPct val="90000"/>
+              </a:lnSpc>
+              <a:spcBef>
+                <a:spcPts val="500"/>
+              </a:spcBef>
+              <a:buFont typeface="Arial" panose="020B0604020202020204" pitchFamily="34" charset="0"/>
+              <a:buNone/>
+              <a:defRPr sz="1600" kern="1200">
+                <a:solidFill>
+                  <a:schemeClr val="tx1"/>
+                </a:solidFill>
+                <a:latin typeface="+mn-lt"/>
+                <a:ea typeface="+mn-ea"/>
+                <a:cs typeface="+mn-cs"/>
+              </a:defRPr>
+            </a:lvl9pPr>
+          </a:lstStyle>
+          <a:p>
+            <a:pPr marL="0" marR="0" lvl="0" indent="0" algn="ctr" defTabSz="914400" rtl="0" eaLnBrk="1" fontAlgn="auto" latinLnBrk="0" hangingPunct="1">
+              <a:lnSpc>
+                <a:spcPct val="90000"/>
+              </a:lnSpc>
+              <a:spcBef>
+                <a:spcPts val="1000"/>
+              </a:spcBef>
+              <a:spcAft>
+                <a:spcPts val="0"/>
+              </a:spcAft>
+              <a:buClrTx/>
+              <a:buSzTx/>
+              <a:buFont typeface="Arial" panose="020B0604020202020204" pitchFamily="34" charset="0"/>
+              <a:buNone/>
+              <a:tabLst/>
+              <a:defRPr/>
+            </a:pPr>
+            <a:r>
+              <a:rPr kumimoji="0" lang="de-DE" sz="3600" b="1" i="0" u="none" strike="noStrike" kern="1200" cap="none" spc="0" normalizeH="0" baseline="0" noProof="0" dirty="0">
+                <a:ln>
+                  <a:noFill/>
+                </a:ln>
+                <a:solidFill>
+                  <a:srgbClr val="FF0000"/>
+                </a:solidFill>
+                <a:effectLst/>
+                <a:uLnTx/>
+                <a:uFillTx/>
+                <a:latin typeface="David CLM" panose="02000603000000000000" pitchFamily="2" charset="-79"/>
+                <a:ea typeface="+mn-ea"/>
+                <a:cs typeface="David CLM" panose="02000603000000000000" pitchFamily="2" charset="-79"/>
+              </a:rPr>
+              <a:t>https://github.com/kneitzel/blog-javafx-series</a:t>
+            </a:r>
+          </a:p>
+        </p:txBody>
+      </p:sp>
+    </p:spTree>
+    <p:extLst>
+      <p:ext uri="{BB962C8B-B14F-4D97-AF65-F5344CB8AC3E}">
+        <p14:creationId xmlns:p14="http://schemas.microsoft.com/office/powerpoint/2010/main" val="1632371496"/>
+      </p:ext>
+    </p:extLst>
+  </p:cSld>
+  <p:clrMapOvr>
+    <a:masterClrMapping/>
+  </p:clrMapOvr>
+</p:sld>
+</file>
+
 <file path=ppt/theme/theme1.xml><?xml version="1.0" encoding="utf-8"?>
 <a:theme xmlns:a="http://schemas.openxmlformats.org/drawingml/2006/main" name="ShapesVTI">
   <a:themeElements>

</xml_diff>